<commit_message>
Regresion Logistica con ej resueltos
</commit_message>
<xml_diff>
--- a/3-Machine Learning/1-Supervisado/2-Logistic Regression/SVL_Machine Learning - Logistic Regression.pptx
+++ b/3-Machine Learning/1-Supervisado/2-Logistic Regression/SVL_Machine Learning - Logistic Regression.pptx
@@ -5338,8 +5338,8 @@
           </a:ln>
         </p:spPr>
       </p:pic>
-      <mc:AlternateContent xmlns:mc="http://schemas.openxmlformats.org/markup-compatibility/2006">
-        <mc:Choice xmlns:a14="http://schemas.microsoft.com/office/drawing/2010/main" Requires="a14">
+      <mc:AlternateContent xmlns:mc="http://schemas.openxmlformats.org/markup-compatibility/2006" xmlns:a14="http://schemas.microsoft.com/office/drawing/2010/main">
+        <mc:Choice Requires="a14">
           <p:sp>
             <p:nvSpPr>
               <p:cNvPr id="7" name="CuadroTexto 6">
@@ -5470,7 +5470,7 @@
             </p:txBody>
           </p:sp>
         </mc:Choice>
-        <mc:Fallback>
+        <mc:Fallback xmlns="">
           <p:sp>
             <p:nvSpPr>
               <p:cNvPr id="7" name="CuadroTexto 6">
@@ -5515,8 +5515,8 @@
           </p:sp>
         </mc:Fallback>
       </mc:AlternateContent>
-      <mc:AlternateContent xmlns:mc="http://schemas.openxmlformats.org/markup-compatibility/2006">
-        <mc:Choice xmlns:a14="http://schemas.microsoft.com/office/drawing/2010/main" Requires="a14">
+      <mc:AlternateContent xmlns:mc="http://schemas.openxmlformats.org/markup-compatibility/2006" xmlns:a14="http://schemas.microsoft.com/office/drawing/2010/main">
+        <mc:Choice Requires="a14">
           <p:sp>
             <p:nvSpPr>
               <p:cNvPr id="8" name="CuadroTexto 7">
@@ -5702,7 +5702,7 @@
             </p:txBody>
           </p:sp>
         </mc:Choice>
-        <mc:Fallback>
+        <mc:Fallback xmlns="">
           <p:sp>
             <p:nvSpPr>
               <p:cNvPr id="8" name="CuadroTexto 7">
@@ -6180,8 +6180,8 @@
           </a:p>
         </p:txBody>
       </p:sp>
-      <mc:AlternateContent xmlns:mc="http://schemas.openxmlformats.org/markup-compatibility/2006">
-        <mc:Choice xmlns:a14="http://schemas.microsoft.com/office/drawing/2010/main" Requires="a14">
+      <mc:AlternateContent xmlns:mc="http://schemas.openxmlformats.org/markup-compatibility/2006" xmlns:a14="http://schemas.microsoft.com/office/drawing/2010/main">
+        <mc:Choice Requires="a14">
           <p:sp>
             <p:nvSpPr>
               <p:cNvPr id="6" name="CuadroTexto 5">
@@ -6481,7 +6481,7 @@
             </p:txBody>
           </p:sp>
         </mc:Choice>
-        <mc:Fallback>
+        <mc:Fallback xmlns="">
           <p:sp>
             <p:nvSpPr>
               <p:cNvPr id="6" name="CuadroTexto 5">
@@ -6526,8 +6526,8 @@
           </p:sp>
         </mc:Fallback>
       </mc:AlternateContent>
-      <mc:AlternateContent xmlns:mc="http://schemas.openxmlformats.org/markup-compatibility/2006">
-        <mc:Choice xmlns:a14="http://schemas.microsoft.com/office/drawing/2010/main" Requires="a14">
+      <mc:AlternateContent xmlns:mc="http://schemas.openxmlformats.org/markup-compatibility/2006" xmlns:a14="http://schemas.microsoft.com/office/drawing/2010/main">
+        <mc:Choice Requires="a14">
           <p:sp>
             <p:nvSpPr>
               <p:cNvPr id="8" name="CuadroTexto 7">
@@ -6853,7 +6853,7 @@
             </p:txBody>
           </p:sp>
         </mc:Choice>
-        <mc:Fallback>
+        <mc:Fallback xmlns="">
           <p:sp>
             <p:nvSpPr>
               <p:cNvPr id="8" name="CuadroTexto 7">
@@ -6980,8 +6980,8 @@
           </a:p>
         </p:txBody>
       </p:sp>
-      <mc:AlternateContent xmlns:mc="http://schemas.openxmlformats.org/markup-compatibility/2006">
-        <mc:Choice xmlns:a14="http://schemas.microsoft.com/office/drawing/2010/main" Requires="a14">
+      <mc:AlternateContent xmlns:mc="http://schemas.openxmlformats.org/markup-compatibility/2006" xmlns:a14="http://schemas.microsoft.com/office/drawing/2010/main">
+        <mc:Choice Requires="a14">
           <p:sp>
             <p:nvSpPr>
               <p:cNvPr id="5" name="CuadroTexto 4">
@@ -7498,7 +7498,7 @@
             </p:txBody>
           </p:sp>
         </mc:Choice>
-        <mc:Fallback>
+        <mc:Fallback xmlns="">
           <p:sp>
             <p:nvSpPr>
               <p:cNvPr id="5" name="CuadroTexto 4">
@@ -7543,8 +7543,8 @@
           </p:sp>
         </mc:Fallback>
       </mc:AlternateContent>
-      <mc:AlternateContent xmlns:mc="http://schemas.openxmlformats.org/markup-compatibility/2006">
-        <mc:Choice xmlns:a14="http://schemas.microsoft.com/office/drawing/2010/main" Requires="a14">
+      <mc:AlternateContent xmlns:mc="http://schemas.openxmlformats.org/markup-compatibility/2006" xmlns:a14="http://schemas.microsoft.com/office/drawing/2010/main">
+        <mc:Choice Requires="a14">
           <p:sp>
             <p:nvSpPr>
               <p:cNvPr id="7" name="CuadroTexto 6">
@@ -7639,10 +7639,11 @@
                     <m:sSub>
                       <m:sSubPr>
                         <m:ctrlPr>
-                          <a:rPr lang="es-ES" sz="2000" spc="-1">
+                          <a:rPr lang="es-ES" sz="2000" i="1" spc="-1">
                             <a:solidFill>
                               <a:srgbClr val="FFFFFF"/>
                             </a:solidFill>
+                            <a:latin typeface="Cambria Math" panose="02040503050406030204" pitchFamily="18" charset="0"/>
                           </a:rPr>
                         </m:ctrlPr>
                       </m:sSubPr>
@@ -7651,10 +7652,11 @@
                           <m:accPr>
                             <m:chr m:val="̂"/>
                             <m:ctrlPr>
-                              <a:rPr lang="es-ES" sz="2000" spc="-1">
+                              <a:rPr lang="es-ES" sz="2000" i="1" spc="-1">
                                 <a:solidFill>
                                   <a:srgbClr val="FFFFFF"/>
                                 </a:solidFill>
+                                <a:latin typeface="Cambria Math" panose="02040503050406030204" pitchFamily="18" charset="0"/>
                               </a:rPr>
                             </m:ctrlPr>
                           </m:accPr>
@@ -7664,6 +7666,7 @@
                                 <a:solidFill>
                                   <a:srgbClr val="FFFFFF"/>
                                 </a:solidFill>
+                                <a:latin typeface="Cambria Math" panose="02040503050406030204" pitchFamily="18" charset="0"/>
                               </a:rPr>
                               <m:t>𝑃</m:t>
                             </m:r>
@@ -7676,6 +7679,7 @@
                             <a:solidFill>
                               <a:srgbClr val="FFFFFF"/>
                             </a:solidFill>
+                            <a:latin typeface="Cambria Math" panose="02040503050406030204" pitchFamily="18" charset="0"/>
                           </a:rPr>
                           <m:t>𝑖</m:t>
                         </m:r>
@@ -7686,16 +7690,9 @@
                         <a:solidFill>
                           <a:srgbClr val="FFFFFF"/>
                         </a:solidFill>
+                        <a:latin typeface="Cambria Math" panose="02040503050406030204" pitchFamily="18" charset="0"/>
                       </a:rPr>
-                      <m:t>→</m:t>
-                    </m:r>
-                    <m:r>
-                      <a:rPr lang="es-ES" sz="2000" spc="-1">
-                        <a:solidFill>
-                          <a:srgbClr val="FFFFFF"/>
-                        </a:solidFill>
-                      </a:rPr>
-                      <m:t>1</m:t>
+                      <m:t>→1</m:t>
                     </m:r>
                   </m:oMath>
                 </a14:m>
@@ -7737,10 +7734,11 @@
                     <m:sSub>
                       <m:sSubPr>
                         <m:ctrlPr>
-                          <a:rPr lang="es-ES" sz="2000" spc="-1">
+                          <a:rPr lang="es-ES" sz="2000" i="1" spc="-1">
                             <a:solidFill>
                               <a:srgbClr val="FFFFFF"/>
                             </a:solidFill>
+                            <a:latin typeface="Cambria Math" panose="02040503050406030204" pitchFamily="18" charset="0"/>
                           </a:rPr>
                         </m:ctrlPr>
                       </m:sSubPr>
@@ -7749,10 +7747,11 @@
                           <m:accPr>
                             <m:chr m:val="̂"/>
                             <m:ctrlPr>
-                              <a:rPr lang="es-ES" sz="2000" spc="-1">
+                              <a:rPr lang="es-ES" sz="2000" i="1" spc="-1">
                                 <a:solidFill>
                                   <a:srgbClr val="FFFFFF"/>
                                 </a:solidFill>
+                                <a:latin typeface="Cambria Math" panose="02040503050406030204" pitchFamily="18" charset="0"/>
                               </a:rPr>
                             </m:ctrlPr>
                           </m:accPr>
@@ -7762,6 +7761,7 @@
                                 <a:solidFill>
                                   <a:srgbClr val="FFFFFF"/>
                                 </a:solidFill>
+                                <a:latin typeface="Cambria Math" panose="02040503050406030204" pitchFamily="18" charset="0"/>
                               </a:rPr>
                               <m:t>𝑃</m:t>
                             </m:r>
@@ -7774,6 +7774,7 @@
                             <a:solidFill>
                               <a:srgbClr val="FFFFFF"/>
                             </a:solidFill>
+                            <a:latin typeface="Cambria Math" panose="02040503050406030204" pitchFamily="18" charset="0"/>
                           </a:rPr>
                           <m:t>𝑖</m:t>
                         </m:r>
@@ -7784,6 +7785,7 @@
                         <a:solidFill>
                           <a:srgbClr val="FFFFFF"/>
                         </a:solidFill>
+                        <a:latin typeface="Cambria Math" panose="02040503050406030204" pitchFamily="18" charset="0"/>
                       </a:rPr>
                       <m:t>→0</m:t>
                     </m:r>
@@ -7857,10 +7859,11 @@
                     <m:sSub>
                       <m:sSubPr>
                         <m:ctrlPr>
-                          <a:rPr lang="es-ES" sz="2000" spc="-1">
+                          <a:rPr lang="es-ES" sz="2000" i="1" spc="-1">
                             <a:solidFill>
                               <a:srgbClr val="FFFFFF"/>
                             </a:solidFill>
+                            <a:latin typeface="Cambria Math" panose="02040503050406030204" pitchFamily="18" charset="0"/>
                           </a:rPr>
                         </m:ctrlPr>
                       </m:sSubPr>
@@ -7869,10 +7872,11 @@
                           <m:accPr>
                             <m:chr m:val="̂"/>
                             <m:ctrlPr>
-                              <a:rPr lang="es-ES" sz="2000" spc="-1">
+                              <a:rPr lang="es-ES" sz="2000" i="1" spc="-1">
                                 <a:solidFill>
                                   <a:srgbClr val="FFFFFF"/>
                                 </a:solidFill>
+                                <a:latin typeface="Cambria Math" panose="02040503050406030204" pitchFamily="18" charset="0"/>
                               </a:rPr>
                             </m:ctrlPr>
                           </m:accPr>
@@ -7882,6 +7886,7 @@
                                 <a:solidFill>
                                   <a:srgbClr val="FFFFFF"/>
                                 </a:solidFill>
+                                <a:latin typeface="Cambria Math" panose="02040503050406030204" pitchFamily="18" charset="0"/>
                               </a:rPr>
                               <m:t>𝑃</m:t>
                             </m:r>
@@ -7894,6 +7899,7 @@
                             <a:solidFill>
                               <a:srgbClr val="FFFFFF"/>
                             </a:solidFill>
+                            <a:latin typeface="Cambria Math" panose="02040503050406030204" pitchFamily="18" charset="0"/>
                           </a:rPr>
                           <m:t>𝑖</m:t>
                         </m:r>
@@ -7904,6 +7910,7 @@
                         <a:solidFill>
                           <a:srgbClr val="FFFFFF"/>
                         </a:solidFill>
+                        <a:latin typeface="Cambria Math" panose="02040503050406030204" pitchFamily="18" charset="0"/>
                       </a:rPr>
                       <m:t>→1</m:t>
                     </m:r>
@@ -7947,10 +7954,11 @@
                     <m:sSub>
                       <m:sSubPr>
                         <m:ctrlPr>
-                          <a:rPr lang="es-ES" sz="2000" spc="-1">
+                          <a:rPr lang="es-ES" sz="2000" i="1" spc="-1">
                             <a:solidFill>
                               <a:srgbClr val="FFFFFF"/>
                             </a:solidFill>
+                            <a:latin typeface="Cambria Math" panose="02040503050406030204" pitchFamily="18" charset="0"/>
                           </a:rPr>
                         </m:ctrlPr>
                       </m:sSubPr>
@@ -7959,10 +7967,11 @@
                           <m:accPr>
                             <m:chr m:val="̂"/>
                             <m:ctrlPr>
-                              <a:rPr lang="es-ES" sz="2000" spc="-1">
+                              <a:rPr lang="es-ES" sz="2000" i="1" spc="-1">
                                 <a:solidFill>
                                   <a:srgbClr val="FFFFFF"/>
                                 </a:solidFill>
+                                <a:latin typeface="Cambria Math" panose="02040503050406030204" pitchFamily="18" charset="0"/>
                               </a:rPr>
                             </m:ctrlPr>
                           </m:accPr>
@@ -7972,6 +7981,7 @@
                                 <a:solidFill>
                                   <a:srgbClr val="FFFFFF"/>
                                 </a:solidFill>
+                                <a:latin typeface="Cambria Math" panose="02040503050406030204" pitchFamily="18" charset="0"/>
                               </a:rPr>
                               <m:t>𝑃</m:t>
                             </m:r>
@@ -7984,6 +7994,7 @@
                             <a:solidFill>
                               <a:srgbClr val="FFFFFF"/>
                             </a:solidFill>
+                            <a:latin typeface="Cambria Math" panose="02040503050406030204" pitchFamily="18" charset="0"/>
                           </a:rPr>
                           <m:t>𝑖</m:t>
                         </m:r>
@@ -7994,6 +8005,7 @@
                         <a:solidFill>
                           <a:srgbClr val="FFFFFF"/>
                         </a:solidFill>
+                        <a:latin typeface="Cambria Math" panose="02040503050406030204" pitchFamily="18" charset="0"/>
                       </a:rPr>
                       <m:t>→0</m:t>
                     </m:r>
@@ -8039,7 +8051,7 @@
             </p:txBody>
           </p:sp>
         </mc:Choice>
-        <mc:Fallback>
+        <mc:Fallback xmlns="">
           <p:sp>
             <p:nvSpPr>
               <p:cNvPr id="7" name="CuadroTexto 6">
@@ -8258,8 +8270,8 @@
           </a:p>
         </p:txBody>
       </p:sp>
-      <mc:AlternateContent xmlns:mc="http://schemas.openxmlformats.org/markup-compatibility/2006">
-        <mc:Choice xmlns:a14="http://schemas.microsoft.com/office/drawing/2010/main" Requires="a14">
+      <mc:AlternateContent xmlns:mc="http://schemas.openxmlformats.org/markup-compatibility/2006" xmlns:a14="http://schemas.microsoft.com/office/drawing/2010/main">
+        <mc:Choice Requires="a14">
           <p:sp>
             <p:nvSpPr>
               <p:cNvPr id="6" name="CuadroTexto 5">
@@ -8542,7 +8554,7 @@
             </p:txBody>
           </p:sp>
         </mc:Choice>
-        <mc:Fallback>
+        <mc:Fallback xmlns="">
           <p:sp>
             <p:nvSpPr>
               <p:cNvPr id="6" name="CuadroTexto 5">
@@ -8587,8 +8599,8 @@
           </p:sp>
         </mc:Fallback>
       </mc:AlternateContent>
-      <mc:AlternateContent xmlns:mc="http://schemas.openxmlformats.org/markup-compatibility/2006">
-        <mc:Choice xmlns:a14="http://schemas.microsoft.com/office/drawing/2010/main" Requires="a14">
+      <mc:AlternateContent xmlns:mc="http://schemas.openxmlformats.org/markup-compatibility/2006" xmlns:a14="http://schemas.microsoft.com/office/drawing/2010/main">
+        <mc:Choice Requires="a14">
           <p:sp>
             <p:nvSpPr>
               <p:cNvPr id="8" name="Marcador de texto 5">
@@ -8808,10 +8820,11 @@
                       <m:accPr>
                         <m:chr m:val="̂"/>
                         <m:ctrlPr>
-                          <a:rPr lang="es-ES" sz="2000" spc="-1">
+                          <a:rPr lang="es-ES" sz="2000" i="1" spc="-1">
                             <a:solidFill>
                               <a:srgbClr val="FFFFFF"/>
                             </a:solidFill>
+                            <a:latin typeface="Cambria Math" panose="02040503050406030204" pitchFamily="18" charset="0"/>
                           </a:rPr>
                         </m:ctrlPr>
                       </m:accPr>
@@ -8821,6 +8834,7 @@
                             <a:solidFill>
                               <a:srgbClr val="FFFFFF"/>
                             </a:solidFill>
+                            <a:latin typeface="Cambria Math" panose="02040503050406030204" pitchFamily="18" charset="0"/>
                           </a:rPr>
                           <m:t>𝑃</m:t>
                         </m:r>
@@ -8829,10 +8843,11 @@
                     <m:d>
                       <m:dPr>
                         <m:ctrlPr>
-                          <a:rPr lang="es-ES" sz="2000" spc="-1">
+                          <a:rPr lang="es-ES" sz="2000" i="1" spc="-1">
                             <a:solidFill>
                               <a:srgbClr val="FFFFFF"/>
                             </a:solidFill>
+                            <a:latin typeface="Cambria Math" panose="02040503050406030204" pitchFamily="18" charset="0"/>
                           </a:rPr>
                         </m:ctrlPr>
                       </m:dPr>
@@ -8842,6 +8857,7 @@
                             <a:solidFill>
                               <a:srgbClr val="FFFFFF"/>
                             </a:solidFill>
+                            <a:latin typeface="Cambria Math" panose="02040503050406030204" pitchFamily="18" charset="0"/>
                           </a:rPr>
                           <m:t>𝑦</m:t>
                         </m:r>
@@ -8850,6 +8866,7 @@
                             <a:solidFill>
                               <a:srgbClr val="FFFFFF"/>
                             </a:solidFill>
+                            <a:latin typeface="Cambria Math" panose="02040503050406030204" pitchFamily="18" charset="0"/>
                           </a:rPr>
                           <m:t>=1</m:t>
                         </m:r>
@@ -8860,30 +8877,16 @@
                         <a:solidFill>
                           <a:srgbClr val="FFFFFF"/>
                         </a:solidFill>
+                        <a:latin typeface="Cambria Math" panose="02040503050406030204" pitchFamily="18" charset="0"/>
                       </a:rPr>
-                      <m:t>&gt;0.</m:t>
+                      <m:t>&gt;0.5→</m:t>
                     </m:r>
                     <m:r>
                       <a:rPr lang="es-ES" sz="2000" spc="-1">
                         <a:solidFill>
                           <a:srgbClr val="FFFFFF"/>
                         </a:solidFill>
-                      </a:rPr>
-                      <m:t>5</m:t>
-                    </m:r>
-                    <m:r>
-                      <a:rPr lang="es-ES" sz="2000" spc="-1">
-                        <a:solidFill>
-                          <a:srgbClr val="FFFFFF"/>
-                        </a:solidFill>
-                      </a:rPr>
-                      <m:t>→</m:t>
-                    </m:r>
-                    <m:r>
-                      <a:rPr lang="es-ES" sz="2000" spc="-1">
-                        <a:solidFill>
-                          <a:srgbClr val="FFFFFF"/>
-                        </a:solidFill>
+                        <a:latin typeface="Cambria Math" panose="02040503050406030204" pitchFamily="18" charset="0"/>
                       </a:rPr>
                       <m:t>𝑦</m:t>
                     </m:r>
@@ -8892,6 +8895,7 @@
                         <a:solidFill>
                           <a:srgbClr val="FFFFFF"/>
                         </a:solidFill>
+                        <a:latin typeface="Cambria Math" panose="02040503050406030204" pitchFamily="18" charset="0"/>
                       </a:rPr>
                       <m:t>=1</m:t>
                     </m:r>
@@ -8916,10 +8920,11 @@
                       <m:accPr>
                         <m:chr m:val="̂"/>
                         <m:ctrlPr>
-                          <a:rPr lang="es-ES" sz="2000" spc="-1">
+                          <a:rPr lang="es-ES" sz="2000" i="1" spc="-1">
                             <a:solidFill>
                               <a:srgbClr val="FFFFFF"/>
                             </a:solidFill>
+                            <a:latin typeface="Cambria Math" panose="02040503050406030204" pitchFamily="18" charset="0"/>
                           </a:rPr>
                         </m:ctrlPr>
                       </m:accPr>
@@ -8929,6 +8934,7 @@
                             <a:solidFill>
                               <a:srgbClr val="FFFFFF"/>
                             </a:solidFill>
+                            <a:latin typeface="Cambria Math" panose="02040503050406030204" pitchFamily="18" charset="0"/>
                           </a:rPr>
                           <m:t>𝑃</m:t>
                         </m:r>
@@ -8937,10 +8943,11 @@
                     <m:d>
                       <m:dPr>
                         <m:ctrlPr>
-                          <a:rPr lang="es-ES" sz="2000" spc="-1">
+                          <a:rPr lang="es-ES" sz="2000" i="1" spc="-1">
                             <a:solidFill>
                               <a:srgbClr val="FFFFFF"/>
                             </a:solidFill>
+                            <a:latin typeface="Cambria Math" panose="02040503050406030204" pitchFamily="18" charset="0"/>
                           </a:rPr>
                         </m:ctrlPr>
                       </m:dPr>
@@ -8950,6 +8957,7 @@
                             <a:solidFill>
                               <a:srgbClr val="FFFFFF"/>
                             </a:solidFill>
+                            <a:latin typeface="Cambria Math" panose="02040503050406030204" pitchFamily="18" charset="0"/>
                           </a:rPr>
                           <m:t>𝑦</m:t>
                         </m:r>
@@ -8958,6 +8966,7 @@
                             <a:solidFill>
                               <a:srgbClr val="FFFFFF"/>
                             </a:solidFill>
+                            <a:latin typeface="Cambria Math" panose="02040503050406030204" pitchFamily="18" charset="0"/>
                           </a:rPr>
                           <m:t>=1</m:t>
                         </m:r>
@@ -8968,30 +8977,16 @@
                         <a:solidFill>
                           <a:srgbClr val="FFFFFF"/>
                         </a:solidFill>
+                        <a:latin typeface="Cambria Math" panose="02040503050406030204" pitchFamily="18" charset="0"/>
                       </a:rPr>
-                      <m:t>&lt;0</m:t>
+                      <m:t>&lt;0.5→</m:t>
                     </m:r>
                     <m:r>
                       <a:rPr lang="es-ES" sz="2000" spc="-1">
                         <a:solidFill>
                           <a:srgbClr val="FFFFFF"/>
                         </a:solidFill>
-                      </a:rPr>
-                      <m:t>.5</m:t>
-                    </m:r>
-                    <m:r>
-                      <a:rPr lang="es-ES" sz="2000" spc="-1">
-                        <a:solidFill>
-                          <a:srgbClr val="FFFFFF"/>
-                        </a:solidFill>
-                      </a:rPr>
-                      <m:t>→</m:t>
-                    </m:r>
-                    <m:r>
-                      <a:rPr lang="es-ES" sz="2000" spc="-1">
-                        <a:solidFill>
-                          <a:srgbClr val="FFFFFF"/>
-                        </a:solidFill>
+                        <a:latin typeface="Cambria Math" panose="02040503050406030204" pitchFamily="18" charset="0"/>
                       </a:rPr>
                       <m:t>𝑦</m:t>
                     </m:r>
@@ -9000,6 +8995,7 @@
                         <a:solidFill>
                           <a:srgbClr val="FFFFFF"/>
                         </a:solidFill>
+                        <a:latin typeface="Cambria Math" panose="02040503050406030204" pitchFamily="18" charset="0"/>
                       </a:rPr>
                       <m:t>=0</m:t>
                     </m:r>
@@ -9015,7 +9011,7 @@
             </p:txBody>
           </p:sp>
         </mc:Choice>
-        <mc:Fallback>
+        <mc:Fallback xmlns="">
           <p:sp>
             <p:nvSpPr>
               <p:cNvPr id="8" name="Marcador de texto 5">
@@ -9090,8 +9086,8 @@
           </a:prstGeom>
         </p:spPr>
       </p:pic>
-      <mc:AlternateContent xmlns:mc="http://schemas.openxmlformats.org/markup-compatibility/2006">
-        <mc:Choice xmlns:a14="http://schemas.microsoft.com/office/drawing/2010/main" Requires="a14">
+      <mc:AlternateContent xmlns:mc="http://schemas.openxmlformats.org/markup-compatibility/2006" xmlns:a14="http://schemas.microsoft.com/office/drawing/2010/main">
+        <mc:Choice Requires="a14">
           <p:sp>
             <p:nvSpPr>
               <p:cNvPr id="22" name="Marcador de texto 5">
@@ -9311,11 +9307,11 @@
                       <m:accPr>
                         <m:chr m:val="̂"/>
                         <m:ctrlPr>
-                          <a:rPr lang="es-ES" sz="2000" spc="-1">
+                          <a:rPr lang="es-ES" sz="2000" i="1" spc="-1">
                             <a:solidFill>
                               <a:srgbClr val="FFFFFF"/>
                             </a:solidFill>
-                            <a:latin typeface="Calibri"/>
+                            <a:latin typeface="Cambria Math" panose="02040503050406030204" pitchFamily="18" charset="0"/>
                           </a:rPr>
                         </m:ctrlPr>
                       </m:accPr>
@@ -9325,7 +9321,7 @@
                             <a:solidFill>
                               <a:srgbClr val="FFFFFF"/>
                             </a:solidFill>
-                            <a:latin typeface="Calibri"/>
+                            <a:latin typeface="Cambria Math" panose="02040503050406030204" pitchFamily="18" charset="0"/>
                           </a:rPr>
                           <m:t>𝑃</m:t>
                         </m:r>
@@ -9334,11 +9330,11 @@
                     <m:d>
                       <m:dPr>
                         <m:ctrlPr>
-                          <a:rPr lang="es-ES" sz="2000" spc="-1">
+                          <a:rPr lang="es-ES" sz="2000" i="1" spc="-1">
                             <a:solidFill>
                               <a:srgbClr val="FFFFFF"/>
                             </a:solidFill>
-                            <a:latin typeface="Calibri"/>
+                            <a:latin typeface="Cambria Math" panose="02040503050406030204" pitchFamily="18" charset="0"/>
                           </a:rPr>
                         </m:ctrlPr>
                       </m:dPr>
@@ -9348,7 +9344,7 @@
                             <a:solidFill>
                               <a:srgbClr val="FFFFFF"/>
                             </a:solidFill>
-                            <a:latin typeface="Calibri"/>
+                            <a:latin typeface="Cambria Math" panose="02040503050406030204" pitchFamily="18" charset="0"/>
                           </a:rPr>
                           <m:t>𝑦</m:t>
                         </m:r>
@@ -9357,7 +9353,7 @@
                             <a:solidFill>
                               <a:srgbClr val="FFFFFF"/>
                             </a:solidFill>
-                            <a:latin typeface="Calibri"/>
+                            <a:latin typeface="Cambria Math" panose="02040503050406030204" pitchFamily="18" charset="0"/>
                           </a:rPr>
                           <m:t>=1</m:t>
                         </m:r>
@@ -9368,34 +9364,16 @@
                         <a:solidFill>
                           <a:srgbClr val="FFFFFF"/>
                         </a:solidFill>
-                        <a:latin typeface="Calibri"/>
+                        <a:latin typeface="Cambria Math" panose="02040503050406030204" pitchFamily="18" charset="0"/>
                       </a:rPr>
-                      <m:t>&gt;0.</m:t>
+                      <m:t>&gt;0.7→</m:t>
                     </m:r>
                     <m:r>
                       <a:rPr lang="es-ES" sz="2000" spc="-1">
                         <a:solidFill>
                           <a:srgbClr val="FFFFFF"/>
                         </a:solidFill>
-                        <a:latin typeface="Calibri"/>
-                      </a:rPr>
-                      <m:t>7</m:t>
-                    </m:r>
-                    <m:r>
-                      <a:rPr lang="es-ES" sz="2000" spc="-1">
-                        <a:solidFill>
-                          <a:srgbClr val="FFFFFF"/>
-                        </a:solidFill>
-                        <a:latin typeface="Calibri"/>
-                      </a:rPr>
-                      <m:t>→</m:t>
-                    </m:r>
-                    <m:r>
-                      <a:rPr lang="es-ES" sz="2000" spc="-1">
-                        <a:solidFill>
-                          <a:srgbClr val="FFFFFF"/>
-                        </a:solidFill>
-                        <a:latin typeface="Calibri"/>
+                        <a:latin typeface="Cambria Math" panose="02040503050406030204" pitchFamily="18" charset="0"/>
                       </a:rPr>
                       <m:t>𝑦</m:t>
                     </m:r>
@@ -9404,7 +9382,7 @@
                         <a:solidFill>
                           <a:srgbClr val="FFFFFF"/>
                         </a:solidFill>
-                        <a:latin typeface="Calibri"/>
+                        <a:latin typeface="Cambria Math" panose="02040503050406030204" pitchFamily="18" charset="0"/>
                       </a:rPr>
                       <m:t>=1</m:t>
                     </m:r>
@@ -9429,11 +9407,11 @@
                       <m:accPr>
                         <m:chr m:val="̂"/>
                         <m:ctrlPr>
-                          <a:rPr lang="es-ES" sz="2000" spc="-1">
+                          <a:rPr lang="es-ES" sz="2000" i="1" spc="-1">
                             <a:solidFill>
                               <a:srgbClr val="FFFFFF"/>
                             </a:solidFill>
-                            <a:latin typeface="Calibri"/>
+                            <a:latin typeface="Cambria Math" panose="02040503050406030204" pitchFamily="18" charset="0"/>
                           </a:rPr>
                         </m:ctrlPr>
                       </m:accPr>
@@ -9443,7 +9421,7 @@
                             <a:solidFill>
                               <a:srgbClr val="FFFFFF"/>
                             </a:solidFill>
-                            <a:latin typeface="Calibri"/>
+                            <a:latin typeface="Cambria Math" panose="02040503050406030204" pitchFamily="18" charset="0"/>
                           </a:rPr>
                           <m:t>𝑃</m:t>
                         </m:r>
@@ -9452,11 +9430,11 @@
                     <m:d>
                       <m:dPr>
                         <m:ctrlPr>
-                          <a:rPr lang="es-ES" sz="2000" spc="-1">
+                          <a:rPr lang="es-ES" sz="2000" i="1" spc="-1">
                             <a:solidFill>
                               <a:srgbClr val="FFFFFF"/>
                             </a:solidFill>
-                            <a:latin typeface="Calibri"/>
+                            <a:latin typeface="Cambria Math" panose="02040503050406030204" pitchFamily="18" charset="0"/>
                           </a:rPr>
                         </m:ctrlPr>
                       </m:dPr>
@@ -9466,7 +9444,7 @@
                             <a:solidFill>
                               <a:srgbClr val="FFFFFF"/>
                             </a:solidFill>
-                            <a:latin typeface="Calibri"/>
+                            <a:latin typeface="Cambria Math" panose="02040503050406030204" pitchFamily="18" charset="0"/>
                           </a:rPr>
                           <m:t>𝑦</m:t>
                         </m:r>
@@ -9475,7 +9453,7 @@
                             <a:solidFill>
                               <a:srgbClr val="FFFFFF"/>
                             </a:solidFill>
-                            <a:latin typeface="Calibri"/>
+                            <a:latin typeface="Cambria Math" panose="02040503050406030204" pitchFamily="18" charset="0"/>
                           </a:rPr>
                           <m:t>=1</m:t>
                         </m:r>
@@ -9486,34 +9464,16 @@
                         <a:solidFill>
                           <a:srgbClr val="FFFFFF"/>
                         </a:solidFill>
-                        <a:latin typeface="Calibri"/>
+                        <a:latin typeface="Cambria Math" panose="02040503050406030204" pitchFamily="18" charset="0"/>
                       </a:rPr>
-                      <m:t>&lt;0.</m:t>
+                      <m:t>&lt;0.7→</m:t>
                     </m:r>
                     <m:r>
                       <a:rPr lang="es-ES" sz="2000" spc="-1">
                         <a:solidFill>
                           <a:srgbClr val="FFFFFF"/>
                         </a:solidFill>
-                        <a:latin typeface="Calibri"/>
-                      </a:rPr>
-                      <m:t>7</m:t>
-                    </m:r>
-                    <m:r>
-                      <a:rPr lang="es-ES" sz="2000" spc="-1">
-                        <a:solidFill>
-                          <a:srgbClr val="FFFFFF"/>
-                        </a:solidFill>
-                        <a:latin typeface="Calibri"/>
-                      </a:rPr>
-                      <m:t>→</m:t>
-                    </m:r>
-                    <m:r>
-                      <a:rPr lang="es-ES" sz="2000" spc="-1">
-                        <a:solidFill>
-                          <a:srgbClr val="FFFFFF"/>
-                        </a:solidFill>
-                        <a:latin typeface="Calibri"/>
+                        <a:latin typeface="Cambria Math" panose="02040503050406030204" pitchFamily="18" charset="0"/>
                       </a:rPr>
                       <m:t>𝑦</m:t>
                     </m:r>
@@ -9522,7 +9482,7 @@
                         <a:solidFill>
                           <a:srgbClr val="FFFFFF"/>
                         </a:solidFill>
-                        <a:latin typeface="Calibri"/>
+                        <a:latin typeface="Cambria Math" panose="02040503050406030204" pitchFamily="18" charset="0"/>
                       </a:rPr>
                       <m:t>=0</m:t>
                     </m:r>
@@ -9538,7 +9498,7 @@
             </p:txBody>
           </p:sp>
         </mc:Choice>
-        <mc:Fallback>
+        <mc:Fallback xmlns="">
           <p:sp>
             <p:nvSpPr>
               <p:cNvPr id="22" name="Marcador de texto 5">
@@ -9613,8 +9573,8 @@
           </a:prstGeom>
         </p:spPr>
       </p:pic>
-      <mc:AlternateContent xmlns:mc="http://schemas.openxmlformats.org/markup-compatibility/2006">
-        <mc:Choice xmlns:a14="http://schemas.microsoft.com/office/drawing/2010/main" Requires="a14">
+      <mc:AlternateContent xmlns:mc="http://schemas.openxmlformats.org/markup-compatibility/2006" xmlns:a14="http://schemas.microsoft.com/office/drawing/2010/main">
+        <mc:Choice Requires="a14">
           <p:sp>
             <p:nvSpPr>
               <p:cNvPr id="25" name="Marcador de texto 5">
@@ -9834,11 +9794,11 @@
                       <m:accPr>
                         <m:chr m:val="̂"/>
                         <m:ctrlPr>
-                          <a:rPr lang="es-ES" sz="2000" spc="-1">
+                          <a:rPr lang="es-ES" sz="2000" i="1" spc="-1">
                             <a:solidFill>
                               <a:srgbClr val="FFFFFF"/>
                             </a:solidFill>
-                            <a:latin typeface="Calibri"/>
+                            <a:latin typeface="Cambria Math" panose="02040503050406030204" pitchFamily="18" charset="0"/>
                           </a:rPr>
                         </m:ctrlPr>
                       </m:accPr>
@@ -9848,7 +9808,7 @@
                             <a:solidFill>
                               <a:srgbClr val="FFFFFF"/>
                             </a:solidFill>
-                            <a:latin typeface="Calibri"/>
+                            <a:latin typeface="Cambria Math" panose="02040503050406030204" pitchFamily="18" charset="0"/>
                           </a:rPr>
                           <m:t>𝑃</m:t>
                         </m:r>
@@ -9857,11 +9817,11 @@
                     <m:d>
                       <m:dPr>
                         <m:ctrlPr>
-                          <a:rPr lang="es-ES" sz="2000" spc="-1">
+                          <a:rPr lang="es-ES" sz="2000" i="1" spc="-1">
                             <a:solidFill>
                               <a:srgbClr val="FFFFFF"/>
                             </a:solidFill>
-                            <a:latin typeface="Calibri"/>
+                            <a:latin typeface="Cambria Math" panose="02040503050406030204" pitchFamily="18" charset="0"/>
                           </a:rPr>
                         </m:ctrlPr>
                       </m:dPr>
@@ -9871,7 +9831,7 @@
                             <a:solidFill>
                               <a:srgbClr val="FFFFFF"/>
                             </a:solidFill>
-                            <a:latin typeface="Calibri"/>
+                            <a:latin typeface="Cambria Math" panose="02040503050406030204" pitchFamily="18" charset="0"/>
                           </a:rPr>
                           <m:t>𝑦</m:t>
                         </m:r>
@@ -9880,7 +9840,7 @@
                             <a:solidFill>
                               <a:srgbClr val="FFFFFF"/>
                             </a:solidFill>
-                            <a:latin typeface="Calibri"/>
+                            <a:latin typeface="Cambria Math" panose="02040503050406030204" pitchFamily="18" charset="0"/>
                           </a:rPr>
                           <m:t>=1</m:t>
                         </m:r>
@@ -9891,7 +9851,7 @@
                         <a:solidFill>
                           <a:srgbClr val="FFFFFF"/>
                         </a:solidFill>
-                        <a:latin typeface="Calibri"/>
+                        <a:latin typeface="Cambria Math" panose="02040503050406030204" pitchFamily="18" charset="0"/>
                       </a:rPr>
                       <m:t>&gt;0.</m:t>
                     </m:r>
@@ -9909,7 +9869,7 @@
                         <a:solidFill>
                           <a:srgbClr val="FFFFFF"/>
                         </a:solidFill>
-                        <a:latin typeface="Calibri"/>
+                        <a:latin typeface="Cambria Math" panose="02040503050406030204" pitchFamily="18" charset="0"/>
                       </a:rPr>
                       <m:t>→</m:t>
                     </m:r>
@@ -9918,7 +9878,7 @@
                         <a:solidFill>
                           <a:srgbClr val="FFFFFF"/>
                         </a:solidFill>
-                        <a:latin typeface="Calibri"/>
+                        <a:latin typeface="Cambria Math" panose="02040503050406030204" pitchFamily="18" charset="0"/>
                       </a:rPr>
                       <m:t>𝑦</m:t>
                     </m:r>
@@ -9927,7 +9887,7 @@
                         <a:solidFill>
                           <a:srgbClr val="FFFFFF"/>
                         </a:solidFill>
-                        <a:latin typeface="Calibri"/>
+                        <a:latin typeface="Cambria Math" panose="02040503050406030204" pitchFamily="18" charset="0"/>
                       </a:rPr>
                       <m:t>=1</m:t>
                     </m:r>
@@ -9952,11 +9912,11 @@
                       <m:accPr>
                         <m:chr m:val="̂"/>
                         <m:ctrlPr>
-                          <a:rPr lang="es-ES" sz="2000" spc="-1">
+                          <a:rPr lang="es-ES" sz="2000" i="1" spc="-1">
                             <a:solidFill>
                               <a:srgbClr val="FFFFFF"/>
                             </a:solidFill>
-                            <a:latin typeface="Calibri"/>
+                            <a:latin typeface="Cambria Math" panose="02040503050406030204" pitchFamily="18" charset="0"/>
                           </a:rPr>
                         </m:ctrlPr>
                       </m:accPr>
@@ -9966,7 +9926,7 @@
                             <a:solidFill>
                               <a:srgbClr val="FFFFFF"/>
                             </a:solidFill>
-                            <a:latin typeface="Calibri"/>
+                            <a:latin typeface="Cambria Math" panose="02040503050406030204" pitchFamily="18" charset="0"/>
                           </a:rPr>
                           <m:t>𝑃</m:t>
                         </m:r>
@@ -9975,11 +9935,11 @@
                     <m:d>
                       <m:dPr>
                         <m:ctrlPr>
-                          <a:rPr lang="es-ES" sz="2000" spc="-1">
+                          <a:rPr lang="es-ES" sz="2000" i="1" spc="-1">
                             <a:solidFill>
                               <a:srgbClr val="FFFFFF"/>
                             </a:solidFill>
-                            <a:latin typeface="Calibri"/>
+                            <a:latin typeface="Cambria Math" panose="02040503050406030204" pitchFamily="18" charset="0"/>
                           </a:rPr>
                         </m:ctrlPr>
                       </m:dPr>
@@ -9989,7 +9949,7 @@
                             <a:solidFill>
                               <a:srgbClr val="FFFFFF"/>
                             </a:solidFill>
-                            <a:latin typeface="Calibri"/>
+                            <a:latin typeface="Cambria Math" panose="02040503050406030204" pitchFamily="18" charset="0"/>
                           </a:rPr>
                           <m:t>𝑦</m:t>
                         </m:r>
@@ -9998,7 +9958,7 @@
                             <a:solidFill>
                               <a:srgbClr val="FFFFFF"/>
                             </a:solidFill>
-                            <a:latin typeface="Calibri"/>
+                            <a:latin typeface="Cambria Math" panose="02040503050406030204" pitchFamily="18" charset="0"/>
                           </a:rPr>
                           <m:t>=1</m:t>
                         </m:r>
@@ -10009,7 +9969,7 @@
                         <a:solidFill>
                           <a:srgbClr val="FFFFFF"/>
                         </a:solidFill>
-                        <a:latin typeface="Calibri"/>
+                        <a:latin typeface="Cambria Math" panose="02040503050406030204" pitchFamily="18" charset="0"/>
                       </a:rPr>
                       <m:t>&lt;0.</m:t>
                     </m:r>
@@ -10027,7 +9987,7 @@
                         <a:solidFill>
                           <a:srgbClr val="FFFFFF"/>
                         </a:solidFill>
-                        <a:latin typeface="Calibri"/>
+                        <a:latin typeface="Cambria Math" panose="02040503050406030204" pitchFamily="18" charset="0"/>
                       </a:rPr>
                       <m:t>→</m:t>
                     </m:r>
@@ -10036,7 +9996,7 @@
                         <a:solidFill>
                           <a:srgbClr val="FFFFFF"/>
                         </a:solidFill>
-                        <a:latin typeface="Calibri"/>
+                        <a:latin typeface="Cambria Math" panose="02040503050406030204" pitchFamily="18" charset="0"/>
                       </a:rPr>
                       <m:t>𝑦</m:t>
                     </m:r>
@@ -10045,7 +10005,7 @@
                         <a:solidFill>
                           <a:srgbClr val="FFFFFF"/>
                         </a:solidFill>
-                        <a:latin typeface="Calibri"/>
+                        <a:latin typeface="Cambria Math" panose="02040503050406030204" pitchFamily="18" charset="0"/>
                       </a:rPr>
                       <m:t>=0</m:t>
                     </m:r>
@@ -10061,7 +10021,7 @@
             </p:txBody>
           </p:sp>
         </mc:Choice>
-        <mc:Fallback>
+        <mc:Fallback xmlns="">
           <p:sp>
             <p:nvSpPr>
               <p:cNvPr id="25" name="Marcador de texto 5">
@@ -10262,8 +10222,8 @@
           </a:prstGeom>
         </p:spPr>
       </p:pic>
-      <mc:AlternateContent xmlns:mc="http://schemas.openxmlformats.org/markup-compatibility/2006">
-        <mc:Choice xmlns:a14="http://schemas.microsoft.com/office/drawing/2010/main" Requires="a14">
+      <mc:AlternateContent xmlns:mc="http://schemas.openxmlformats.org/markup-compatibility/2006" xmlns:a14="http://schemas.microsoft.com/office/drawing/2010/main">
+        <mc:Choice Requires="a14">
           <p:sp>
             <p:nvSpPr>
               <p:cNvPr id="13" name="CuadroTexto 12">
@@ -10670,7 +10630,7 @@
             </p:txBody>
           </p:sp>
         </mc:Choice>
-        <mc:Fallback>
+        <mc:Fallback xmlns="">
           <p:sp>
             <p:nvSpPr>
               <p:cNvPr id="13" name="CuadroTexto 12">
@@ -10731,7 +10691,7 @@
             </p:nvSpPr>
             <p:spPr>
               <a:xfrm>
-                <a:off x="6667326" y="2753137"/>
+                <a:off x="6667326" y="2740612"/>
                 <a:ext cx="4580920" cy="862224"/>
               </a:xfrm>
               <a:prstGeom prst="rect">
@@ -11260,7 +11220,7 @@
             </p:nvSpPr>
             <p:spPr>
               <a:xfrm>
-                <a:off x="6667326" y="2753137"/>
+                <a:off x="6667326" y="2740612"/>
                 <a:ext cx="4580920" cy="862224"/>
               </a:xfrm>
               <a:prstGeom prst="rect">
@@ -11288,8 +11248,8 @@
           </p:sp>
         </mc:Fallback>
       </mc:AlternateContent>
-      <mc:AlternateContent xmlns:mc="http://schemas.openxmlformats.org/markup-compatibility/2006">
-        <mc:Choice xmlns:a14="http://schemas.microsoft.com/office/drawing/2010/main" Requires="a14">
+      <mc:AlternateContent xmlns:mc="http://schemas.openxmlformats.org/markup-compatibility/2006" xmlns:a14="http://schemas.microsoft.com/office/drawing/2010/main">
+        <mc:Choice Requires="a14">
           <p:sp>
             <p:nvSpPr>
               <p:cNvPr id="15" name="CuadroTexto 14">
@@ -11820,7 +11780,7 @@
             </p:txBody>
           </p:sp>
         </mc:Choice>
-        <mc:Fallback>
+        <mc:Fallback xmlns="">
           <p:sp>
             <p:nvSpPr>
               <p:cNvPr id="15" name="CuadroTexto 14">
@@ -11865,8 +11825,8 @@
           </p:sp>
         </mc:Fallback>
       </mc:AlternateContent>
-      <mc:AlternateContent xmlns:mc="http://schemas.openxmlformats.org/markup-compatibility/2006">
-        <mc:Choice xmlns:a14="http://schemas.microsoft.com/office/drawing/2010/main" Requires="a14">
+      <mc:AlternateContent xmlns:mc="http://schemas.openxmlformats.org/markup-compatibility/2006" xmlns:a14="http://schemas.microsoft.com/office/drawing/2010/main">
+        <mc:Choice Requires="a14">
           <p:sp>
             <p:nvSpPr>
               <p:cNvPr id="16" name="CuadroTexto 15">
@@ -12228,7 +12188,7 @@
             </p:txBody>
           </p:sp>
         </mc:Choice>
-        <mc:Fallback>
+        <mc:Fallback xmlns="">
           <p:sp>
             <p:nvSpPr>
               <p:cNvPr id="16" name="CuadroTexto 15">

</xml_diff>